<commit_message>
replaces current with SNAPSHOT
</commit_message>
<xml_diff>
--- a/content/versions/current/guides/dg/images/contributing/git-workflow.pptx
+++ b/content/versions/current/guides/dg/images/contributing/git-workflow.pptx
@@ -6,7 +6,6 @@
   </p:sldMasterIdLst>
   <p:sldIdLst>
     <p:sldId id="256" r:id="rId2"/>
-    <p:sldId id="257" r:id="rId3"/>
   </p:sldIdLst>
   <p:sldSz cx="9144000" cy="6858000" type="screen4x3"/>
   <p:notesSz cx="6858000" cy="9144000"/>
@@ -107,10 +106,25 @@
   </p:defaultTextStyle>
   <p:extLst>
     <p:ext uri="{EFAFB233-063F-42B5-8137-9DF3F51BA10A}">
-      <p15:sldGuideLst xmlns="" xmlns:p15="http://schemas.microsoft.com/office/powerpoint/2012/main"/>
+      <p15:sldGuideLst xmlns:p15="http://schemas.microsoft.com/office/powerpoint/2012/main">
+        <p15:guide id="1" orient="horz" pos="2160">
+          <p15:clr>
+            <a:srgbClr val="A4A3A4"/>
+          </p15:clr>
+        </p15:guide>
+        <p15:guide id="2" pos="2880">
+          <p15:clr>
+            <a:srgbClr val="A4A3A4"/>
+          </p15:clr>
+        </p15:guide>
+      </p15:sldGuideLst>
     </p:ext>
   </p:extLst>
 </p:presentation>
+</file>
+
+<file path=ppt/revisionInfo.xml><?xml version="1.0" encoding="utf-8"?>
+<p1510:revInfo xmlns:a="http://schemas.openxmlformats.org/drawingml/2006/main" xmlns:r="http://schemas.openxmlformats.org/officeDocument/2006/relationships" xmlns:p1510="http://schemas.microsoft.com/office/powerpoint/2015/10/main"/>
 </file>
 
 <file path=ppt/slideLayouts/slideLayout1.xml><?xml version="1.0" encoding="utf-8"?>
@@ -155,10 +169,9 @@
           </a:lstStyle>
           <a:p>
             <a:r>
-              <a:rPr lang="en-US" smtClean="0"/>
+              <a:rPr lang="en-US"/>
               <a:t>Click to edit Master title style</a:t>
             </a:r>
-            <a:endParaRPr lang="en-US"/>
           </a:p>
         </p:txBody>
       </p:sp>
@@ -220,10 +233,9 @@
           </a:lstStyle>
           <a:p>
             <a:r>
-              <a:rPr lang="en-US" smtClean="0"/>
+              <a:rPr lang="en-US"/>
               <a:t>Click to edit Master subtitle style</a:t>
             </a:r>
-            <a:endParaRPr lang="en-US"/>
           </a:p>
         </p:txBody>
       </p:sp>
@@ -244,7 +256,7 @@
           <a:p>
             <a:fld id="{EA4A70C8-4F78-455D-BEBD-FAD3400884CB}" type="datetimeFigureOut">
               <a:rPr lang="en-US" smtClean="0"/>
-              <a:t>10/16/2014</a:t>
+              <a:t>1/4/2018</a:t>
             </a:fld>
             <a:endParaRPr lang="en-US"/>
           </a:p>
@@ -338,10 +350,9 @@
           <a:lstStyle/>
           <a:p>
             <a:r>
-              <a:rPr lang="en-US" smtClean="0"/>
+              <a:rPr lang="en-US"/>
               <a:t>Click to edit Master title style</a:t>
             </a:r>
-            <a:endParaRPr lang="en-US"/>
           </a:p>
         </p:txBody>
       </p:sp>
@@ -362,38 +373,37 @@
           <a:p>
             <a:pPr lvl="0"/>
             <a:r>
-              <a:rPr lang="en-US" smtClean="0"/>
+              <a:rPr lang="en-US"/>
               <a:t>Click to edit Master text styles</a:t>
             </a:r>
           </a:p>
           <a:p>
             <a:pPr lvl="1"/>
             <a:r>
-              <a:rPr lang="en-US" smtClean="0"/>
+              <a:rPr lang="en-US"/>
               <a:t>Second level</a:t>
             </a:r>
           </a:p>
           <a:p>
             <a:pPr lvl="2"/>
             <a:r>
-              <a:rPr lang="en-US" smtClean="0"/>
+              <a:rPr lang="en-US"/>
               <a:t>Third level</a:t>
             </a:r>
           </a:p>
           <a:p>
             <a:pPr lvl="3"/>
             <a:r>
-              <a:rPr lang="en-US" smtClean="0"/>
+              <a:rPr lang="en-US"/>
               <a:t>Fourth level</a:t>
             </a:r>
           </a:p>
           <a:p>
             <a:pPr lvl="4"/>
             <a:r>
-              <a:rPr lang="en-US" smtClean="0"/>
+              <a:rPr lang="en-US"/>
               <a:t>Fifth level</a:t>
             </a:r>
-            <a:endParaRPr lang="en-US"/>
           </a:p>
         </p:txBody>
       </p:sp>
@@ -414,7 +424,7 @@
           <a:p>
             <a:fld id="{EA4A70C8-4F78-455D-BEBD-FAD3400884CB}" type="datetimeFigureOut">
               <a:rPr lang="en-US" smtClean="0"/>
-              <a:t>10/16/2014</a:t>
+              <a:t>1/4/2018</a:t>
             </a:fld>
             <a:endParaRPr lang="en-US"/>
           </a:p>
@@ -513,10 +523,9 @@
           <a:lstStyle/>
           <a:p>
             <a:r>
-              <a:rPr lang="en-US" smtClean="0"/>
+              <a:rPr lang="en-US"/>
               <a:t>Click to edit Master title style</a:t>
             </a:r>
-            <a:endParaRPr lang="en-US"/>
           </a:p>
         </p:txBody>
       </p:sp>
@@ -542,38 +551,37 @@
           <a:p>
             <a:pPr lvl="0"/>
             <a:r>
-              <a:rPr lang="en-US" smtClean="0"/>
+              <a:rPr lang="en-US"/>
               <a:t>Click to edit Master text styles</a:t>
             </a:r>
           </a:p>
           <a:p>
             <a:pPr lvl="1"/>
             <a:r>
-              <a:rPr lang="en-US" smtClean="0"/>
+              <a:rPr lang="en-US"/>
               <a:t>Second level</a:t>
             </a:r>
           </a:p>
           <a:p>
             <a:pPr lvl="2"/>
             <a:r>
-              <a:rPr lang="en-US" smtClean="0"/>
+              <a:rPr lang="en-US"/>
               <a:t>Third level</a:t>
             </a:r>
           </a:p>
           <a:p>
             <a:pPr lvl="3"/>
             <a:r>
-              <a:rPr lang="en-US" smtClean="0"/>
+              <a:rPr lang="en-US"/>
               <a:t>Fourth level</a:t>
             </a:r>
           </a:p>
           <a:p>
             <a:pPr lvl="4"/>
             <a:r>
-              <a:rPr lang="en-US" smtClean="0"/>
+              <a:rPr lang="en-US"/>
               <a:t>Fifth level</a:t>
             </a:r>
-            <a:endParaRPr lang="en-US"/>
           </a:p>
         </p:txBody>
       </p:sp>
@@ -594,7 +602,7 @@
           <a:p>
             <a:fld id="{EA4A70C8-4F78-455D-BEBD-FAD3400884CB}" type="datetimeFigureOut">
               <a:rPr lang="en-US" smtClean="0"/>
-              <a:t>10/16/2014</a:t>
+              <a:t>1/4/2018</a:t>
             </a:fld>
             <a:endParaRPr lang="en-US"/>
           </a:p>
@@ -688,10 +696,9 @@
           <a:lstStyle/>
           <a:p>
             <a:r>
-              <a:rPr lang="en-US" smtClean="0"/>
+              <a:rPr lang="en-US"/>
               <a:t>Click to edit Master title style</a:t>
             </a:r>
-            <a:endParaRPr lang="en-US"/>
           </a:p>
         </p:txBody>
       </p:sp>
@@ -712,38 +719,37 @@
           <a:p>
             <a:pPr lvl="0"/>
             <a:r>
-              <a:rPr lang="en-US" smtClean="0"/>
+              <a:rPr lang="en-US"/>
               <a:t>Click to edit Master text styles</a:t>
             </a:r>
           </a:p>
           <a:p>
             <a:pPr lvl="1"/>
             <a:r>
-              <a:rPr lang="en-US" smtClean="0"/>
+              <a:rPr lang="en-US"/>
               <a:t>Second level</a:t>
             </a:r>
           </a:p>
           <a:p>
             <a:pPr lvl="2"/>
             <a:r>
-              <a:rPr lang="en-US" smtClean="0"/>
+              <a:rPr lang="en-US"/>
               <a:t>Third level</a:t>
             </a:r>
           </a:p>
           <a:p>
             <a:pPr lvl="3"/>
             <a:r>
-              <a:rPr lang="en-US" smtClean="0"/>
+              <a:rPr lang="en-US"/>
               <a:t>Fourth level</a:t>
             </a:r>
           </a:p>
           <a:p>
             <a:pPr lvl="4"/>
             <a:r>
-              <a:rPr lang="en-US" smtClean="0"/>
+              <a:rPr lang="en-US"/>
               <a:t>Fifth level</a:t>
             </a:r>
-            <a:endParaRPr lang="en-US"/>
           </a:p>
         </p:txBody>
       </p:sp>
@@ -764,7 +770,7 @@
           <a:p>
             <a:fld id="{EA4A70C8-4F78-455D-BEBD-FAD3400884CB}" type="datetimeFigureOut">
               <a:rPr lang="en-US" smtClean="0"/>
-              <a:t>10/16/2014</a:t>
+              <a:t>1/4/2018</a:t>
             </a:fld>
             <a:endParaRPr lang="en-US"/>
           </a:p>
@@ -867,10 +873,9 @@
           </a:lstStyle>
           <a:p>
             <a:r>
-              <a:rPr lang="en-US" smtClean="0"/>
+              <a:rPr lang="en-US"/>
               <a:t>Click to edit Master title style</a:t>
             </a:r>
-            <a:endParaRPr lang="en-US"/>
           </a:p>
         </p:txBody>
       </p:sp>
@@ -987,7 +992,7 @@
           <a:p>
             <a:pPr lvl="0"/>
             <a:r>
-              <a:rPr lang="en-US" smtClean="0"/>
+              <a:rPr lang="en-US"/>
               <a:t>Click to edit Master text styles</a:t>
             </a:r>
           </a:p>
@@ -1010,7 +1015,7 @@
           <a:p>
             <a:fld id="{EA4A70C8-4F78-455D-BEBD-FAD3400884CB}" type="datetimeFigureOut">
               <a:rPr lang="en-US" smtClean="0"/>
-              <a:t>10/16/2014</a:t>
+              <a:t>1/4/2018</a:t>
             </a:fld>
             <a:endParaRPr lang="en-US"/>
           </a:p>
@@ -1104,10 +1109,9 @@
           <a:lstStyle/>
           <a:p>
             <a:r>
-              <a:rPr lang="en-US" smtClean="0"/>
+              <a:rPr lang="en-US"/>
               <a:t>Click to edit Master title style</a:t>
             </a:r>
-            <a:endParaRPr lang="en-US"/>
           </a:p>
         </p:txBody>
       </p:sp>
@@ -1133,38 +1137,37 @@
           <a:p>
             <a:pPr lvl="0"/>
             <a:r>
-              <a:rPr lang="en-US" smtClean="0"/>
+              <a:rPr lang="en-US"/>
               <a:t>Click to edit Master text styles</a:t>
             </a:r>
           </a:p>
           <a:p>
             <a:pPr lvl="1"/>
             <a:r>
-              <a:rPr lang="en-US" smtClean="0"/>
+              <a:rPr lang="en-US"/>
               <a:t>Second level</a:t>
             </a:r>
           </a:p>
           <a:p>
             <a:pPr lvl="2"/>
             <a:r>
-              <a:rPr lang="en-US" smtClean="0"/>
+              <a:rPr lang="en-US"/>
               <a:t>Third level</a:t>
             </a:r>
           </a:p>
           <a:p>
             <a:pPr lvl="3"/>
             <a:r>
-              <a:rPr lang="en-US" smtClean="0"/>
+              <a:rPr lang="en-US"/>
               <a:t>Fourth level</a:t>
             </a:r>
           </a:p>
           <a:p>
             <a:pPr lvl="4"/>
             <a:r>
-              <a:rPr lang="en-US" smtClean="0"/>
+              <a:rPr lang="en-US"/>
               <a:t>Fifth level</a:t>
             </a:r>
-            <a:endParaRPr lang="en-US"/>
           </a:p>
         </p:txBody>
       </p:sp>
@@ -1190,38 +1193,37 @@
           <a:p>
             <a:pPr lvl="0"/>
             <a:r>
-              <a:rPr lang="en-US" smtClean="0"/>
+              <a:rPr lang="en-US"/>
               <a:t>Click to edit Master text styles</a:t>
             </a:r>
           </a:p>
           <a:p>
             <a:pPr lvl="1"/>
             <a:r>
-              <a:rPr lang="en-US" smtClean="0"/>
+              <a:rPr lang="en-US"/>
               <a:t>Second level</a:t>
             </a:r>
           </a:p>
           <a:p>
             <a:pPr lvl="2"/>
             <a:r>
-              <a:rPr lang="en-US" smtClean="0"/>
+              <a:rPr lang="en-US"/>
               <a:t>Third level</a:t>
             </a:r>
           </a:p>
           <a:p>
             <a:pPr lvl="3"/>
             <a:r>
-              <a:rPr lang="en-US" smtClean="0"/>
+              <a:rPr lang="en-US"/>
               <a:t>Fourth level</a:t>
             </a:r>
           </a:p>
           <a:p>
             <a:pPr lvl="4"/>
             <a:r>
-              <a:rPr lang="en-US" smtClean="0"/>
+              <a:rPr lang="en-US"/>
               <a:t>Fifth level</a:t>
             </a:r>
-            <a:endParaRPr lang="en-US"/>
           </a:p>
         </p:txBody>
       </p:sp>
@@ -1242,7 +1244,7 @@
           <a:p>
             <a:fld id="{EA4A70C8-4F78-455D-BEBD-FAD3400884CB}" type="datetimeFigureOut">
               <a:rPr lang="en-US" smtClean="0"/>
-              <a:t>10/16/2014</a:t>
+              <a:t>1/4/2018</a:t>
             </a:fld>
             <a:endParaRPr lang="en-US"/>
           </a:p>
@@ -1341,10 +1343,9 @@
           <a:lstStyle/>
           <a:p>
             <a:r>
-              <a:rPr lang="en-US" smtClean="0"/>
+              <a:rPr lang="en-US"/>
               <a:t>Click to edit Master title style</a:t>
             </a:r>
-            <a:endParaRPr lang="en-US"/>
           </a:p>
         </p:txBody>
       </p:sp>
@@ -1407,7 +1408,7 @@
           <a:p>
             <a:pPr lvl="0"/>
             <a:r>
-              <a:rPr lang="en-US" smtClean="0"/>
+              <a:rPr lang="en-US"/>
               <a:t>Click to edit Master text styles</a:t>
             </a:r>
           </a:p>
@@ -1435,38 +1436,37 @@
           <a:p>
             <a:pPr lvl="0"/>
             <a:r>
-              <a:rPr lang="en-US" smtClean="0"/>
+              <a:rPr lang="en-US"/>
               <a:t>Click to edit Master text styles</a:t>
             </a:r>
           </a:p>
           <a:p>
             <a:pPr lvl="1"/>
             <a:r>
-              <a:rPr lang="en-US" smtClean="0"/>
+              <a:rPr lang="en-US"/>
               <a:t>Second level</a:t>
             </a:r>
           </a:p>
           <a:p>
             <a:pPr lvl="2"/>
             <a:r>
-              <a:rPr lang="en-US" smtClean="0"/>
+              <a:rPr lang="en-US"/>
               <a:t>Third level</a:t>
             </a:r>
           </a:p>
           <a:p>
             <a:pPr lvl="3"/>
             <a:r>
-              <a:rPr lang="en-US" smtClean="0"/>
+              <a:rPr lang="en-US"/>
               <a:t>Fourth level</a:t>
             </a:r>
           </a:p>
           <a:p>
             <a:pPr lvl="4"/>
             <a:r>
-              <a:rPr lang="en-US" smtClean="0"/>
+              <a:rPr lang="en-US"/>
               <a:t>Fifth level</a:t>
             </a:r>
-            <a:endParaRPr lang="en-US"/>
           </a:p>
         </p:txBody>
       </p:sp>
@@ -1529,7 +1529,7 @@
           <a:p>
             <a:pPr lvl="0"/>
             <a:r>
-              <a:rPr lang="en-US" smtClean="0"/>
+              <a:rPr lang="en-US"/>
               <a:t>Click to edit Master text styles</a:t>
             </a:r>
           </a:p>
@@ -1557,38 +1557,37 @@
           <a:p>
             <a:pPr lvl="0"/>
             <a:r>
-              <a:rPr lang="en-US" smtClean="0"/>
+              <a:rPr lang="en-US"/>
               <a:t>Click to edit Master text styles</a:t>
             </a:r>
           </a:p>
           <a:p>
             <a:pPr lvl="1"/>
             <a:r>
-              <a:rPr lang="en-US" smtClean="0"/>
+              <a:rPr lang="en-US"/>
               <a:t>Second level</a:t>
             </a:r>
           </a:p>
           <a:p>
             <a:pPr lvl="2"/>
             <a:r>
-              <a:rPr lang="en-US" smtClean="0"/>
+              <a:rPr lang="en-US"/>
               <a:t>Third level</a:t>
             </a:r>
           </a:p>
           <a:p>
             <a:pPr lvl="3"/>
             <a:r>
-              <a:rPr lang="en-US" smtClean="0"/>
+              <a:rPr lang="en-US"/>
               <a:t>Fourth level</a:t>
             </a:r>
           </a:p>
           <a:p>
             <a:pPr lvl="4"/>
             <a:r>
-              <a:rPr lang="en-US" smtClean="0"/>
+              <a:rPr lang="en-US"/>
               <a:t>Fifth level</a:t>
             </a:r>
-            <a:endParaRPr lang="en-US"/>
           </a:p>
         </p:txBody>
       </p:sp>
@@ -1609,7 +1608,7 @@
           <a:p>
             <a:fld id="{EA4A70C8-4F78-455D-BEBD-FAD3400884CB}" type="datetimeFigureOut">
               <a:rPr lang="en-US" smtClean="0"/>
-              <a:t>10/16/2014</a:t>
+              <a:t>1/4/2018</a:t>
             </a:fld>
             <a:endParaRPr lang="en-US"/>
           </a:p>
@@ -1703,10 +1702,9 @@
           <a:lstStyle/>
           <a:p>
             <a:r>
-              <a:rPr lang="en-US" smtClean="0"/>
+              <a:rPr lang="en-US"/>
               <a:t>Click to edit Master title style</a:t>
             </a:r>
-            <a:endParaRPr lang="en-US"/>
           </a:p>
         </p:txBody>
       </p:sp>
@@ -1727,7 +1725,7 @@
           <a:p>
             <a:fld id="{EA4A70C8-4F78-455D-BEBD-FAD3400884CB}" type="datetimeFigureOut">
               <a:rPr lang="en-US" smtClean="0"/>
-              <a:t>10/16/2014</a:t>
+              <a:t>1/4/2018</a:t>
             </a:fld>
             <a:endParaRPr lang="en-US"/>
           </a:p>
@@ -1822,7 +1820,7 @@
           <a:p>
             <a:fld id="{EA4A70C8-4F78-455D-BEBD-FAD3400884CB}" type="datetimeFigureOut">
               <a:rPr lang="en-US" smtClean="0"/>
-              <a:t>10/16/2014</a:t>
+              <a:t>1/4/2018</a:t>
             </a:fld>
             <a:endParaRPr lang="en-US"/>
           </a:p>
@@ -1925,10 +1923,9 @@
           </a:lstStyle>
           <a:p>
             <a:r>
-              <a:rPr lang="en-US" smtClean="0"/>
+              <a:rPr lang="en-US"/>
               <a:t>Click to edit Master title style</a:t>
             </a:r>
-            <a:endParaRPr lang="en-US"/>
           </a:p>
         </p:txBody>
       </p:sp>
@@ -1982,38 +1979,37 @@
           <a:p>
             <a:pPr lvl="0"/>
             <a:r>
-              <a:rPr lang="en-US" smtClean="0"/>
+              <a:rPr lang="en-US"/>
               <a:t>Click to edit Master text styles</a:t>
             </a:r>
           </a:p>
           <a:p>
             <a:pPr lvl="1"/>
             <a:r>
-              <a:rPr lang="en-US" smtClean="0"/>
+              <a:rPr lang="en-US"/>
               <a:t>Second level</a:t>
             </a:r>
           </a:p>
           <a:p>
             <a:pPr lvl="2"/>
             <a:r>
-              <a:rPr lang="en-US" smtClean="0"/>
+              <a:rPr lang="en-US"/>
               <a:t>Third level</a:t>
             </a:r>
           </a:p>
           <a:p>
             <a:pPr lvl="3"/>
             <a:r>
-              <a:rPr lang="en-US" smtClean="0"/>
+              <a:rPr lang="en-US"/>
               <a:t>Fourth level</a:t>
             </a:r>
           </a:p>
           <a:p>
             <a:pPr lvl="4"/>
             <a:r>
-              <a:rPr lang="en-US" smtClean="0"/>
+              <a:rPr lang="en-US"/>
               <a:t>Fifth level</a:t>
             </a:r>
-            <a:endParaRPr lang="en-US"/>
           </a:p>
         </p:txBody>
       </p:sp>
@@ -2076,7 +2072,7 @@
           <a:p>
             <a:pPr lvl="0"/>
             <a:r>
-              <a:rPr lang="en-US" smtClean="0"/>
+              <a:rPr lang="en-US"/>
               <a:t>Click to edit Master text styles</a:t>
             </a:r>
           </a:p>
@@ -2099,7 +2095,7 @@
           <a:p>
             <a:fld id="{EA4A70C8-4F78-455D-BEBD-FAD3400884CB}" type="datetimeFigureOut">
               <a:rPr lang="en-US" smtClean="0"/>
-              <a:t>10/16/2014</a:t>
+              <a:t>1/4/2018</a:t>
             </a:fld>
             <a:endParaRPr lang="en-US"/>
           </a:p>
@@ -2202,10 +2198,9 @@
           </a:lstStyle>
           <a:p>
             <a:r>
-              <a:rPr lang="en-US" smtClean="0"/>
+              <a:rPr lang="en-US"/>
               <a:t>Click to edit Master title style</a:t>
             </a:r>
-            <a:endParaRPr lang="en-US"/>
           </a:p>
         </p:txBody>
       </p:sp>
@@ -2329,7 +2324,7 @@
           <a:p>
             <a:pPr lvl="0"/>
             <a:r>
-              <a:rPr lang="en-US" smtClean="0"/>
+              <a:rPr lang="en-US"/>
               <a:t>Click to edit Master text styles</a:t>
             </a:r>
           </a:p>
@@ -2352,7 +2347,7 @@
           <a:p>
             <a:fld id="{EA4A70C8-4F78-455D-BEBD-FAD3400884CB}" type="datetimeFigureOut">
               <a:rPr lang="en-US" smtClean="0"/>
-              <a:t>10/16/2014</a:t>
+              <a:t>1/4/2018</a:t>
             </a:fld>
             <a:endParaRPr lang="en-US"/>
           </a:p>
@@ -2461,10 +2456,9 @@
           <a:lstStyle/>
           <a:p>
             <a:r>
-              <a:rPr lang="en-US" smtClean="0"/>
+              <a:rPr lang="en-US"/>
               <a:t>Click to edit Master title style</a:t>
             </a:r>
-            <a:endParaRPr lang="en-US"/>
           </a:p>
         </p:txBody>
       </p:sp>
@@ -2495,38 +2489,37 @@
           <a:p>
             <a:pPr lvl="0"/>
             <a:r>
-              <a:rPr lang="en-US" smtClean="0"/>
+              <a:rPr lang="en-US"/>
               <a:t>Click to edit Master text styles</a:t>
             </a:r>
           </a:p>
           <a:p>
             <a:pPr lvl="1"/>
             <a:r>
-              <a:rPr lang="en-US" smtClean="0"/>
+              <a:rPr lang="en-US"/>
               <a:t>Second level</a:t>
             </a:r>
           </a:p>
           <a:p>
             <a:pPr lvl="2"/>
             <a:r>
-              <a:rPr lang="en-US" smtClean="0"/>
+              <a:rPr lang="en-US"/>
               <a:t>Third level</a:t>
             </a:r>
           </a:p>
           <a:p>
             <a:pPr lvl="3"/>
             <a:r>
-              <a:rPr lang="en-US" smtClean="0"/>
+              <a:rPr lang="en-US"/>
               <a:t>Fourth level</a:t>
             </a:r>
           </a:p>
           <a:p>
             <a:pPr lvl="4"/>
             <a:r>
-              <a:rPr lang="en-US" smtClean="0"/>
+              <a:rPr lang="en-US"/>
               <a:t>Fifth level</a:t>
             </a:r>
-            <a:endParaRPr lang="en-US"/>
           </a:p>
         </p:txBody>
       </p:sp>
@@ -2565,7 +2558,7 @@
           <a:p>
             <a:fld id="{EA4A70C8-4F78-455D-BEBD-FAD3400884CB}" type="datetimeFigureOut">
               <a:rPr lang="en-US" smtClean="0"/>
-              <a:t>10/16/2014</a:t>
+              <a:t>1/4/2018</a:t>
             </a:fld>
             <a:endParaRPr lang="en-US"/>
           </a:p>
@@ -2972,127 +2965,13 @@
       </p:grpSpPr>
       <p:sp>
         <p:nvSpPr>
-          <p:cNvPr id="4" name="Flowchart: Magnetic Disk 3"/>
-          <p:cNvSpPr/>
-          <p:nvPr/>
-        </p:nvSpPr>
-        <p:spPr>
-          <a:xfrm>
-            <a:off x="719163" y="1057319"/>
-            <a:ext cx="1858296" cy="1022555"/>
-          </a:xfrm>
-          <a:prstGeom prst="flowChartMagneticDisk">
-            <a:avLst/>
-          </a:prstGeom>
-        </p:spPr>
-        <p:style>
-          <a:lnRef idx="2">
-            <a:schemeClr val="accent2">
-              <a:shade val="50000"/>
-            </a:schemeClr>
-          </a:lnRef>
-          <a:fillRef idx="1">
-            <a:schemeClr val="accent2"/>
-          </a:fillRef>
-          <a:effectRef idx="0">
-            <a:schemeClr val="accent2"/>
-          </a:effectRef>
-          <a:fontRef idx="minor">
-            <a:schemeClr val="lt1"/>
-          </a:fontRef>
-        </p:style>
-        <p:txBody>
-          <a:bodyPr rtlCol="0" anchor="ctr"/>
-          <a:lstStyle/>
-          <a:p>
-            <a:pPr algn="ctr"/>
-            <a:r>
-              <a:rPr lang="en-GB" sz="1400" dirty="0" smtClean="0"/>
-              <a:t>git-wip-us.apache.org/</a:t>
-            </a:r>
-            <a:br>
-              <a:rPr lang="en-GB" sz="1400" dirty="0" smtClean="0"/>
-            </a:br>
-            <a:r>
-              <a:rPr lang="en-GB" sz="1400" dirty="0" smtClean="0"/>
-              <a:t>repos/</a:t>
-            </a:r>
-            <a:r>
-              <a:rPr lang="en-GB" sz="1400" dirty="0" err="1" smtClean="0"/>
-              <a:t>asf</a:t>
-            </a:r>
-            <a:r>
-              <a:rPr lang="en-GB" sz="1400" dirty="0" smtClean="0"/>
-              <a:t>/</a:t>
-            </a:r>
-            <a:r>
-              <a:rPr lang="en-GB" sz="1400" dirty="0" err="1" smtClean="0"/>
-              <a:t>isis.git</a:t>
-            </a:r>
-            <a:endParaRPr lang="en-US" sz="1400" dirty="0"/>
-          </a:p>
-        </p:txBody>
-      </p:sp>
-      <p:sp>
-        <p:nvSpPr>
-          <p:cNvPr id="5" name="Flowchart: Magnetic Disk 4"/>
-          <p:cNvSpPr/>
-          <p:nvPr/>
-        </p:nvSpPr>
-        <p:spPr>
-          <a:xfrm>
-            <a:off x="3307858" y="382401"/>
-            <a:ext cx="1858296" cy="1022555"/>
-          </a:xfrm>
-          <a:prstGeom prst="flowChartMagneticDisk">
-            <a:avLst/>
-          </a:prstGeom>
-        </p:spPr>
-        <p:style>
-          <a:lnRef idx="2">
-            <a:schemeClr val="accent2">
-              <a:shade val="50000"/>
-            </a:schemeClr>
-          </a:lnRef>
-          <a:fillRef idx="1">
-            <a:schemeClr val="accent2"/>
-          </a:fillRef>
-          <a:effectRef idx="0">
-            <a:schemeClr val="accent2"/>
-          </a:effectRef>
-          <a:fontRef idx="minor">
-            <a:schemeClr val="lt1"/>
-          </a:fontRef>
-        </p:style>
-        <p:txBody>
-          <a:bodyPr rtlCol="0" anchor="ctr"/>
-          <a:lstStyle/>
-          <a:p>
-            <a:pPr algn="ctr"/>
-            <a:r>
-              <a:rPr lang="en-GB" sz="1400" dirty="0" smtClean="0"/>
-              <a:t>git.apache.org/</a:t>
-            </a:r>
-            <a:br>
-              <a:rPr lang="en-GB" sz="1400" dirty="0" smtClean="0"/>
-            </a:br>
-            <a:r>
-              <a:rPr lang="en-GB" sz="1400" dirty="0" err="1" smtClean="0"/>
-              <a:t>isis.git</a:t>
-            </a:r>
-            <a:endParaRPr lang="en-US" sz="1400" dirty="0"/>
-          </a:p>
-        </p:txBody>
-      </p:sp>
-      <p:sp>
-        <p:nvSpPr>
           <p:cNvPr id="6" name="Flowchart: Magnetic Disk 5"/>
           <p:cNvSpPr/>
           <p:nvPr/>
         </p:nvSpPr>
         <p:spPr>
           <a:xfrm>
-            <a:off x="3775945" y="1860404"/>
+            <a:off x="2013297" y="750903"/>
             <a:ext cx="1858296" cy="1022555"/>
           </a:xfrm>
           <a:prstGeom prst="flowChartMagneticDisk">
@@ -3121,18 +3000,18 @@
           <a:p>
             <a:pPr algn="ctr"/>
             <a:r>
-              <a:rPr lang="en-GB" sz="1400" dirty="0" smtClean="0"/>
+              <a:rPr lang="en-GB" sz="1400" dirty="0"/>
               <a:t>github.com/</a:t>
             </a:r>
             <a:br>
-              <a:rPr lang="en-GB" sz="1400" dirty="0" smtClean="0"/>
+              <a:rPr lang="en-GB" sz="1400" dirty="0"/>
             </a:br>
             <a:r>
-              <a:rPr lang="en-GB" sz="1400" dirty="0" smtClean="0"/>
+              <a:rPr lang="en-GB" sz="1400" dirty="0"/>
               <a:t>apache/</a:t>
             </a:r>
             <a:r>
-              <a:rPr lang="en-GB" sz="1400" dirty="0" err="1" smtClean="0"/>
+              <a:rPr lang="en-GB" sz="1400" dirty="0" err="1"/>
               <a:t>isis.git</a:t>
             </a:r>
             <a:endParaRPr lang="en-US" sz="1400" dirty="0"/>
@@ -3147,7 +3026,7 @@
         </p:nvSpPr>
         <p:spPr>
           <a:xfrm>
-            <a:off x="6276500" y="2872778"/>
+            <a:off x="6027118" y="1916814"/>
             <a:ext cx="1858296" cy="1022555"/>
           </a:xfrm>
           <a:prstGeom prst="flowChartMagneticDisk">
@@ -3176,22 +3055,22 @@
           <a:p>
             <a:pPr algn="ctr"/>
             <a:r>
-              <a:rPr lang="en-GB" sz="1400" dirty="0" smtClean="0"/>
+              <a:rPr lang="en-GB" sz="1400" dirty="0"/>
               <a:t>github.com/</a:t>
             </a:r>
             <a:br>
-              <a:rPr lang="en-GB" sz="1400" dirty="0" smtClean="0"/>
+              <a:rPr lang="en-GB" sz="1400" dirty="0"/>
             </a:br>
             <a:r>
-              <a:rPr lang="en-GB" sz="1400" dirty="0" err="1" smtClean="0"/>
+              <a:rPr lang="en-GB" sz="1400" dirty="0" err="1"/>
               <a:t>joedeveloper</a:t>
             </a:r>
             <a:r>
-              <a:rPr lang="en-GB" sz="1400" dirty="0" smtClean="0"/>
+              <a:rPr lang="en-GB" sz="1400" dirty="0"/>
               <a:t>/</a:t>
             </a:r>
             <a:r>
-              <a:rPr lang="en-GB" sz="1400" dirty="0" err="1" smtClean="0"/>
+              <a:rPr lang="en-GB" sz="1400" dirty="0" err="1"/>
               <a:t>isis.git</a:t>
             </a:r>
             <a:endParaRPr lang="en-US" sz="1400" dirty="0"/>
@@ -3206,7 +3085,7 @@
         </p:nvSpPr>
         <p:spPr>
           <a:xfrm>
-            <a:off x="820998" y="4858188"/>
+            <a:off x="571616" y="3902224"/>
             <a:ext cx="1681316" cy="1130710"/>
           </a:xfrm>
           <a:prstGeom prst="rect">
@@ -3246,7 +3125,7 @@
         </p:nvSpPr>
         <p:spPr>
           <a:xfrm>
-            <a:off x="997979" y="4990921"/>
+            <a:off x="748597" y="4034957"/>
             <a:ext cx="1297856" cy="870155"/>
           </a:xfrm>
           <a:prstGeom prst="flowChartMagneticDisk">
@@ -3275,7 +3154,7 @@
           <a:p>
             <a:pPr algn="ctr"/>
             <a:r>
-              <a:rPr lang="en-GB" sz="1400" dirty="0" smtClean="0"/>
+              <a:rPr lang="en-GB" sz="1400" dirty="0"/>
               <a:t>local git clone</a:t>
             </a:r>
             <a:endParaRPr lang="en-US" sz="1400" dirty="0"/>
@@ -3290,7 +3169,7 @@
         </p:nvSpPr>
         <p:spPr>
           <a:xfrm>
-            <a:off x="634183" y="6077386"/>
+            <a:off x="384801" y="5121422"/>
             <a:ext cx="2074607" cy="501446"/>
           </a:xfrm>
           <a:prstGeom prst="trapezoid">
@@ -3321,7 +3200,7 @@
           <a:p>
             <a:pPr algn="ctr"/>
             <a:r>
-              <a:rPr lang="en-GB" dirty="0" smtClean="0"/>
+              <a:rPr lang="en-GB" dirty="0"/>
               <a:t>COMMITTER</a:t>
             </a:r>
             <a:endParaRPr lang="en-US" dirty="0"/>
@@ -3336,7 +3215,7 @@
         </p:nvSpPr>
         <p:spPr>
           <a:xfrm>
-            <a:off x="6386762" y="4858188"/>
+            <a:off x="6137380" y="3902224"/>
             <a:ext cx="1681316" cy="1130710"/>
           </a:xfrm>
           <a:prstGeom prst="rect">
@@ -3376,7 +3255,7 @@
         </p:nvSpPr>
         <p:spPr>
           <a:xfrm>
-            <a:off x="6563743" y="4990921"/>
+            <a:off x="6314361" y="4034957"/>
             <a:ext cx="1297856" cy="870155"/>
           </a:xfrm>
           <a:prstGeom prst="flowChartMagneticDisk">
@@ -3405,7 +3284,7 @@
           <a:p>
             <a:pPr algn="ctr"/>
             <a:r>
-              <a:rPr lang="en-GB" sz="1400" dirty="0" smtClean="0"/>
+              <a:rPr lang="en-GB" sz="1400" dirty="0"/>
               <a:t>local git clone</a:t>
             </a:r>
             <a:endParaRPr lang="en-US" sz="1400" dirty="0"/>
@@ -3420,7 +3299,7 @@
         </p:nvSpPr>
         <p:spPr>
           <a:xfrm>
-            <a:off x="6199947" y="6077386"/>
+            <a:off x="5950565" y="5121422"/>
             <a:ext cx="2074607" cy="501446"/>
           </a:xfrm>
           <a:prstGeom prst="trapezoid">
@@ -3451,99 +3330,13 @@
           <a:p>
             <a:pPr algn="ctr"/>
             <a:r>
-              <a:rPr lang="en-GB" dirty="0" smtClean="0"/>
+              <a:rPr lang="en-GB" dirty="0"/>
               <a:t>CONTRIBUTOR</a:t>
             </a:r>
             <a:endParaRPr lang="en-US" dirty="0"/>
           </a:p>
         </p:txBody>
       </p:sp>
-      <p:cxnSp>
-        <p:nvCxnSpPr>
-          <p:cNvPr id="15" name="Curved Connector 14"/>
-          <p:cNvCxnSpPr>
-            <a:stCxn id="4" idx="4"/>
-            <a:endCxn id="5" idx="2"/>
-          </p:cNvCxnSpPr>
-          <p:nvPr/>
-        </p:nvCxnSpPr>
-        <p:spPr>
-          <a:xfrm flipV="1">
-            <a:off x="2577459" y="893679"/>
-            <a:ext cx="730399" cy="674918"/>
-          </a:xfrm>
-          <a:prstGeom prst="curvedConnector3">
-            <a:avLst>
-              <a:gd name="adj1" fmla="val 50000"/>
-            </a:avLst>
-          </a:prstGeom>
-          <a:ln w="28575">
-            <a:solidFill>
-              <a:schemeClr val="bg2">
-                <a:lumMod val="75000"/>
-              </a:schemeClr>
-            </a:solidFill>
-            <a:prstDash val="sysDash"/>
-            <a:tailEnd type="triangle" w="lg" len="lg"/>
-          </a:ln>
-        </p:spPr>
-        <p:style>
-          <a:lnRef idx="1">
-            <a:schemeClr val="accent1"/>
-          </a:lnRef>
-          <a:fillRef idx="0">
-            <a:schemeClr val="accent1"/>
-          </a:fillRef>
-          <a:effectRef idx="0">
-            <a:schemeClr val="accent1"/>
-          </a:effectRef>
-          <a:fontRef idx="minor">
-            <a:schemeClr val="tx1"/>
-          </a:fontRef>
-        </p:style>
-      </p:cxnSp>
-      <p:cxnSp>
-        <p:nvCxnSpPr>
-          <p:cNvPr id="16" name="Curved Connector 15"/>
-          <p:cNvCxnSpPr>
-            <a:stCxn id="4" idx="4"/>
-            <a:endCxn id="6" idx="2"/>
-          </p:cNvCxnSpPr>
-          <p:nvPr/>
-        </p:nvCxnSpPr>
-        <p:spPr>
-          <a:xfrm>
-            <a:off x="2577459" y="1568597"/>
-            <a:ext cx="1198486" cy="803085"/>
-          </a:xfrm>
-          <a:prstGeom prst="curvedConnector3">
-            <a:avLst>
-              <a:gd name="adj1" fmla="val 50000"/>
-            </a:avLst>
-          </a:prstGeom>
-          <a:ln w="28575">
-            <a:solidFill>
-              <a:schemeClr val="accent1"/>
-            </a:solidFill>
-            <a:prstDash val="sysDash"/>
-            <a:tailEnd type="triangle" w="lg" len="lg"/>
-          </a:ln>
-        </p:spPr>
-        <p:style>
-          <a:lnRef idx="1">
-            <a:schemeClr val="accent1"/>
-          </a:lnRef>
-          <a:fillRef idx="0">
-            <a:schemeClr val="accent1"/>
-          </a:fillRef>
-          <a:effectRef idx="0">
-            <a:schemeClr val="accent1"/>
-          </a:effectRef>
-          <a:fontRef idx="minor">
-            <a:schemeClr val="tx1"/>
-          </a:fontRef>
-        </p:style>
-      </p:cxnSp>
       <p:cxnSp>
         <p:nvCxnSpPr>
           <p:cNvPr id="19" name="Curved Connector 18"/>
@@ -3555,8 +3348,8 @@
         </p:nvCxnSpPr>
         <p:spPr>
           <a:xfrm>
-            <a:off x="5634241" y="2371682"/>
-            <a:ext cx="1571407" cy="501096"/>
+            <a:off x="3871593" y="1262181"/>
+            <a:ext cx="3084673" cy="654633"/>
           </a:xfrm>
           <a:prstGeom prst="curvedConnector2">
             <a:avLst/>
@@ -3597,7 +3390,7 @@
         </p:nvCxnSpPr>
         <p:spPr>
           <a:xfrm flipH="1">
-            <a:off x="7861599" y="3384056"/>
+            <a:off x="7612217" y="2428092"/>
             <a:ext cx="273197" cy="2041943"/>
           </a:xfrm>
           <a:prstGeom prst="curvedConnector3">
@@ -3641,7 +3434,7 @@
         </p:nvCxnSpPr>
         <p:spPr>
           <a:xfrm rot="16200000" flipV="1">
-            <a:off x="6661366" y="4439615"/>
+            <a:off x="6411984" y="3483651"/>
             <a:ext cx="1095588" cy="7023"/>
           </a:xfrm>
           <a:prstGeom prst="curvedConnector3">
@@ -3651,50 +3444,6 @@
           </a:prstGeom>
           <a:ln w="28575">
             <a:prstDash val="solid"/>
-            <a:tailEnd type="triangle" w="lg" len="lg"/>
-          </a:ln>
-        </p:spPr>
-        <p:style>
-          <a:lnRef idx="1">
-            <a:schemeClr val="accent1"/>
-          </a:lnRef>
-          <a:fillRef idx="0">
-            <a:schemeClr val="accent1"/>
-          </a:fillRef>
-          <a:effectRef idx="0">
-            <a:schemeClr val="accent1"/>
-          </a:effectRef>
-          <a:fontRef idx="minor">
-            <a:schemeClr val="tx1"/>
-          </a:fontRef>
-        </p:style>
-      </p:cxnSp>
-      <p:cxnSp>
-        <p:nvCxnSpPr>
-          <p:cNvPr id="34" name="Curved Connector 33"/>
-          <p:cNvCxnSpPr>
-            <a:stCxn id="4" idx="2"/>
-            <a:endCxn id="9" idx="2"/>
-          </p:cNvCxnSpPr>
-          <p:nvPr/>
-        </p:nvCxnSpPr>
-        <p:spPr>
-          <a:xfrm rot="10800000" flipH="1" flipV="1">
-            <a:off x="719163" y="1568597"/>
-            <a:ext cx="278816" cy="3857402"/>
-          </a:xfrm>
-          <a:prstGeom prst="curvedConnector3">
-            <a:avLst>
-              <a:gd name="adj1" fmla="val -81990"/>
-            </a:avLst>
-          </a:prstGeom>
-          <a:ln w="28575">
-            <a:solidFill>
-              <a:schemeClr val="bg1">
-                <a:lumMod val="50000"/>
-              </a:schemeClr>
-            </a:solidFill>
-            <a:prstDash val="sysDot"/>
             <a:tailEnd type="triangle" w="lg" len="lg"/>
           </a:ln>
         </p:spPr>
@@ -3717,20 +3466,19 @@
         <p:nvCxnSpPr>
           <p:cNvPr id="39" name="Curved Connector 38"/>
           <p:cNvCxnSpPr>
+            <a:cxnSpLocks/>
             <a:stCxn id="9" idx="1"/>
-            <a:endCxn id="4" idx="3"/>
+            <a:endCxn id="6" idx="2"/>
           </p:cNvCxnSpPr>
           <p:nvPr/>
         </p:nvCxnSpPr>
         <p:spPr>
           <a:xfrm rot="5400000" flipH="1" flipV="1">
-            <a:off x="192086" y="3534696"/>
-            <a:ext cx="2911047" cy="1404"/>
-          </a:xfrm>
-          <a:prstGeom prst="curvedConnector3">
-            <a:avLst>
-              <a:gd name="adj1" fmla="val 50000"/>
-            </a:avLst>
+            <a:off x="319023" y="2340683"/>
+            <a:ext cx="2772776" cy="615772"/>
+          </a:xfrm>
+          <a:prstGeom prst="curvedConnector2">
+            <a:avLst/>
           </a:prstGeom>
           <a:ln w="28575">
             <a:prstDash val="solid"/>
@@ -3764,7 +3512,7 @@
         </p:nvCxnSpPr>
         <p:spPr>
           <a:xfrm rot="10800000" flipV="1">
-            <a:off x="2295836" y="3384055"/>
+            <a:off x="2046454" y="2428091"/>
             <a:ext cx="3980665" cy="2041943"/>
           </a:xfrm>
           <a:prstGeom prst="curvedConnector3">
@@ -3800,7 +3548,7 @@
         </p:nvSpPr>
         <p:spPr>
           <a:xfrm>
-            <a:off x="5797715" y="2002796"/>
+            <a:off x="5548333" y="1046832"/>
             <a:ext cx="1359090" cy="307777"/>
           </a:xfrm>
           <a:prstGeom prst="rect">
@@ -3816,12 +3564,8 @@
           <a:p>
             <a:pPr algn="ctr"/>
             <a:r>
-              <a:rPr lang="en-GB" sz="1400" dirty="0" smtClean="0"/>
-              <a:t>1. one-time </a:t>
-            </a:r>
-            <a:r>
-              <a:rPr lang="en-GB" sz="1400" dirty="0" smtClean="0"/>
-              <a:t>fork</a:t>
+              <a:rPr lang="en-GB" sz="1400" dirty="0"/>
+              <a:t>1. one-time fork</a:t>
             </a:r>
             <a:endParaRPr lang="en-US" sz="1400" dirty="0"/>
           </a:p>
@@ -3829,14 +3573,14 @@
       </p:sp>
       <p:sp>
         <p:nvSpPr>
-          <p:cNvPr id="50" name="TextBox 49"/>
+          <p:cNvPr id="51" name="TextBox 50"/>
           <p:cNvSpPr txBox="1"/>
           <p:nvPr/>
         </p:nvSpPr>
         <p:spPr>
           <a:xfrm>
-            <a:off x="3132763" y="1437164"/>
-            <a:ext cx="1211358" cy="307777"/>
+            <a:off x="1476296" y="2361450"/>
+            <a:ext cx="766555" cy="523220"/>
           </a:xfrm>
           <a:prstGeom prst="rect">
             <a:avLst/>
@@ -3851,8 +3595,15 @@
           <a:p>
             <a:pPr algn="ctr"/>
             <a:r>
-              <a:rPr lang="en-GB" sz="1400" dirty="0" smtClean="0"/>
-              <a:t>real-time sync</a:t>
+              <a:rPr lang="en-GB" sz="1400" dirty="0"/>
+              <a:t>git pull</a:t>
+            </a:r>
+            <a:br>
+              <a:rPr lang="en-GB" sz="1400" dirty="0"/>
+            </a:br>
+            <a:r>
+              <a:rPr lang="en-GB" sz="1400" dirty="0"/>
+              <a:t>git push</a:t>
             </a:r>
             <a:endParaRPr lang="en-US" sz="1400" dirty="0"/>
           </a:p>
@@ -3860,14 +3611,14 @@
       </p:sp>
       <p:sp>
         <p:nvSpPr>
-          <p:cNvPr id="51" name="TextBox 50"/>
+          <p:cNvPr id="52" name="TextBox 51"/>
           <p:cNvSpPr txBox="1"/>
           <p:nvPr/>
         </p:nvSpPr>
         <p:spPr>
           <a:xfrm>
-            <a:off x="1725678" y="3317414"/>
-            <a:ext cx="766555" cy="523220"/>
+            <a:off x="6130166" y="3209830"/>
+            <a:ext cx="942887" cy="307777"/>
           </a:xfrm>
           <a:prstGeom prst="rect">
             <a:avLst/>
@@ -3882,54 +3633,8 @@
           <a:p>
             <a:pPr algn="ctr"/>
             <a:r>
-              <a:rPr lang="en-GB" sz="1400" dirty="0" smtClean="0"/>
-              <a:t>git pull</a:t>
-            </a:r>
-            <a:br>
-              <a:rPr lang="en-GB" sz="1400" dirty="0" smtClean="0"/>
-            </a:br>
-            <a:r>
-              <a:rPr lang="en-GB" sz="1400" dirty="0" smtClean="0"/>
-              <a:t>git push</a:t>
-            </a:r>
-            <a:endParaRPr lang="en-US" sz="1400" dirty="0"/>
-          </a:p>
-        </p:txBody>
-      </p:sp>
-      <p:sp>
-        <p:nvSpPr>
-          <p:cNvPr id="52" name="TextBox 51"/>
-          <p:cNvSpPr txBox="1"/>
-          <p:nvPr/>
-        </p:nvSpPr>
-        <p:spPr>
-          <a:xfrm>
-            <a:off x="6379548" y="4165794"/>
-            <a:ext cx="942887" cy="307777"/>
-          </a:xfrm>
-          <a:prstGeom prst="rect">
-            <a:avLst/>
-          </a:prstGeom>
-          <a:noFill/>
-        </p:spPr>
-        <p:txBody>
-          <a:bodyPr wrap="none" rtlCol="0">
-            <a:spAutoFit/>
-          </a:bodyPr>
-          <a:lstStyle/>
-          <a:p>
-            <a:pPr algn="ctr"/>
-            <a:r>
               <a:rPr lang="en-GB" sz="1400" dirty="0"/>
-              <a:t>4</a:t>
-            </a:r>
-            <a:r>
-              <a:rPr lang="en-GB" sz="1400" dirty="0" smtClean="0"/>
-              <a:t>. git </a:t>
-            </a:r>
-            <a:r>
-              <a:rPr lang="en-GB" sz="1400" dirty="0" smtClean="0"/>
-              <a:t>push</a:t>
+              <a:t>4. git push</a:t>
             </a:r>
             <a:endParaRPr lang="en-US" sz="1400" dirty="0"/>
           </a:p>
@@ -3946,8 +3651,8 @@
         </p:nvCxnSpPr>
         <p:spPr>
           <a:xfrm rot="16200000" flipH="1">
-            <a:off x="4362898" y="3225154"/>
-            <a:ext cx="2543040" cy="1858650"/>
+            <a:off x="3280115" y="1435788"/>
+            <a:ext cx="2696577" cy="3371916"/>
           </a:xfrm>
           <a:prstGeom prst="curvedConnector2">
             <a:avLst/>
@@ -3980,7 +3685,7 @@
         </p:nvSpPr>
         <p:spPr>
           <a:xfrm>
-            <a:off x="5148870" y="5210310"/>
+            <a:off x="4856467" y="3838617"/>
             <a:ext cx="861134" cy="307777"/>
           </a:xfrm>
           <a:prstGeom prst="rect">
@@ -3996,12 +3701,8 @@
           <a:p>
             <a:pPr algn="ctr"/>
             <a:r>
-              <a:rPr lang="en-GB" sz="1400" dirty="0" smtClean="0"/>
-              <a:t>3. git </a:t>
-            </a:r>
-            <a:r>
-              <a:rPr lang="en-GB" sz="1400" dirty="0" smtClean="0"/>
-              <a:t>pull</a:t>
+              <a:rPr lang="en-GB" sz="1400" dirty="0"/>
+              <a:t>3. git pull</a:t>
             </a:r>
             <a:endParaRPr lang="en-US" sz="1400" dirty="0"/>
           </a:p>
@@ -4015,7 +3716,7 @@
         </p:nvSpPr>
         <p:spPr>
           <a:xfrm>
-            <a:off x="8158675" y="5053961"/>
+            <a:off x="7909293" y="4097997"/>
             <a:ext cx="1029449" cy="523220"/>
           </a:xfrm>
           <a:prstGeom prst="rect">
@@ -4031,56 +3732,14 @@
           <a:p>
             <a:pPr algn="ctr"/>
             <a:r>
-              <a:rPr lang="en-GB" sz="1400" dirty="0" smtClean="0"/>
+              <a:rPr lang="en-GB" sz="1400" dirty="0"/>
               <a:t>2. one-time</a:t>
             </a:r>
-            <a:r>
-              <a:rPr lang="en-GB" sz="1400" dirty="0" smtClean="0"/>
-              <a:t/>
-            </a:r>
             <a:br>
-              <a:rPr lang="en-GB" sz="1400" dirty="0" smtClean="0"/>
+              <a:rPr lang="en-GB" sz="1400" dirty="0"/>
             </a:br>
             <a:r>
-              <a:rPr lang="en-GB" sz="1400" dirty="0" smtClean="0"/>
-              <a:t>clone</a:t>
-            </a:r>
-            <a:endParaRPr lang="en-US" sz="1400" dirty="0"/>
-          </a:p>
-        </p:txBody>
-      </p:sp>
-      <p:sp>
-        <p:nvSpPr>
-          <p:cNvPr id="58" name="TextBox 57"/>
-          <p:cNvSpPr txBox="1"/>
-          <p:nvPr/>
-        </p:nvSpPr>
-        <p:spPr>
-          <a:xfrm>
-            <a:off x="486442" y="3521037"/>
-            <a:ext cx="853118" cy="523220"/>
-          </a:xfrm>
-          <a:prstGeom prst="rect">
-            <a:avLst/>
-          </a:prstGeom>
-          <a:noFill/>
-        </p:spPr>
-        <p:txBody>
-          <a:bodyPr wrap="none" rtlCol="0">
-            <a:spAutoFit/>
-          </a:bodyPr>
-          <a:lstStyle/>
-          <a:p>
-            <a:pPr algn="ctr"/>
-            <a:r>
-              <a:rPr lang="en-GB" sz="1400" dirty="0" smtClean="0"/>
-              <a:t>one-time</a:t>
-            </a:r>
-            <a:br>
-              <a:rPr lang="en-GB" sz="1400" dirty="0" smtClean="0"/>
-            </a:br>
-            <a:r>
-              <a:rPr lang="en-GB" sz="1400" dirty="0" smtClean="0"/>
+              <a:rPr lang="en-GB" sz="1400" dirty="0"/>
               <a:t>clone</a:t>
             </a:r>
             <a:endParaRPr lang="en-US" sz="1400" dirty="0"/>
@@ -4095,7 +3754,7 @@
         </p:nvSpPr>
         <p:spPr>
           <a:xfrm>
-            <a:off x="3767853" y="5795975"/>
+            <a:off x="3518471" y="4840011"/>
             <a:ext cx="706244" cy="721531"/>
           </a:xfrm>
           <a:prstGeom prst="flowChartDocument">
@@ -4124,7 +3783,7 @@
           <a:p>
             <a:pPr algn="ctr"/>
             <a:r>
-              <a:rPr lang="en-GB" dirty="0" smtClean="0"/>
+              <a:rPr lang="en-GB" dirty="0"/>
               <a:t>JIRA</a:t>
             </a:r>
             <a:endParaRPr lang="en-US" dirty="0"/>
@@ -4139,7 +3798,7 @@
         </p:nvSpPr>
         <p:spPr>
           <a:xfrm>
-            <a:off x="2449724" y="4620491"/>
+            <a:off x="2200342" y="3664527"/>
             <a:ext cx="1486176" cy="523220"/>
           </a:xfrm>
           <a:prstGeom prst="rect">
@@ -4156,17 +3815,13 @@
             <a:pPr algn="ctr"/>
             <a:r>
               <a:rPr lang="en-GB" sz="1400" dirty="0"/>
-              <a:t>7</a:t>
-            </a:r>
-            <a:r>
-              <a:rPr lang="en-GB" sz="1400" dirty="0" smtClean="0"/>
-              <a:t>. Review &amp; apply</a:t>
+              <a:t>7. Review &amp; apply</a:t>
             </a:r>
             <a:br>
-              <a:rPr lang="en-GB" sz="1400" dirty="0" smtClean="0"/>
+              <a:rPr lang="en-GB" sz="1400" dirty="0"/>
             </a:br>
             <a:r>
-              <a:rPr lang="en-GB" sz="1400" dirty="0" smtClean="0"/>
+              <a:rPr lang="en-GB" sz="1400" dirty="0"/>
               <a:t>pull request</a:t>
             </a:r>
             <a:endParaRPr lang="en-US" sz="1400" dirty="0"/>
@@ -4181,7 +3836,7 @@
         </p:nvSpPr>
         <p:spPr>
           <a:xfrm>
-            <a:off x="3513162" y="5509263"/>
+            <a:off x="3263780" y="4553299"/>
             <a:ext cx="1185389" cy="307777"/>
           </a:xfrm>
           <a:prstGeom prst="rect">
@@ -4197,7 +3852,7 @@
           <a:p>
             <a:pPr algn="ctr"/>
             <a:r>
-              <a:rPr lang="en-GB" sz="1400" dirty="0" smtClean="0"/>
+              <a:rPr lang="en-GB" sz="1400" dirty="0"/>
               <a:t>5. Create JIRA</a:t>
             </a:r>
             <a:endParaRPr lang="en-US" sz="1400" dirty="0"/>
@@ -4212,7 +3867,7 @@
         </p:nvSpPr>
         <p:spPr>
           <a:xfrm>
-            <a:off x="4786893" y="5804889"/>
+            <a:off x="4537511" y="4848925"/>
             <a:ext cx="1219756" cy="523220"/>
           </a:xfrm>
           <a:prstGeom prst="rect">
@@ -4228,22 +3883,18 @@
           <a:p>
             <a:pPr algn="ctr"/>
             <a:r>
-              <a:rPr lang="en-GB" sz="1400" dirty="0" smtClean="0"/>
+              <a:rPr lang="en-GB" sz="1400" dirty="0"/>
               <a:t>6. raise </a:t>
             </a:r>
             <a:r>
-              <a:rPr lang="en-GB" sz="1400" dirty="0" err="1" smtClean="0"/>
+              <a:rPr lang="en-GB" sz="1400" dirty="0" err="1"/>
               <a:t>github</a:t>
-            </a:r>
-            <a:r>
-              <a:rPr lang="en-GB" sz="1400" dirty="0"/>
-              <a:t/>
             </a:r>
             <a:br>
               <a:rPr lang="en-GB" sz="1400" dirty="0"/>
             </a:br>
             <a:r>
-              <a:rPr lang="en-GB" sz="1400" dirty="0" smtClean="0"/>
+              <a:rPr lang="en-GB" sz="1400" dirty="0"/>
               <a:t>pull request</a:t>
             </a:r>
             <a:endParaRPr lang="en-US" sz="1400" dirty="0"/>
@@ -4254,1098 +3905,6 @@
     <p:extLst>
       <p:ext uri="{BB962C8B-B14F-4D97-AF65-F5344CB8AC3E}">
         <p14:creationId xmlns:p14="http://schemas.microsoft.com/office/powerpoint/2010/main" val="1131451127"/>
-      </p:ext>
-    </p:extLst>
-  </p:cSld>
-  <p:clrMapOvr>
-    <a:masterClrMapping/>
-  </p:clrMapOvr>
-  <p:timing>
-    <p:tnLst>
-      <p:par>
-        <p:cTn id="1" dur="indefinite" restart="never" nodeType="tmRoot"/>
-      </p:par>
-    </p:tnLst>
-  </p:timing>
-</p:sld>
-</file>
-
-<file path=ppt/slides/slide2.xml><?xml version="1.0" encoding="utf-8"?>
-<p:sld xmlns:a="http://schemas.openxmlformats.org/drawingml/2006/main" xmlns:r="http://schemas.openxmlformats.org/officeDocument/2006/relationships" xmlns:p="http://schemas.openxmlformats.org/presentationml/2006/main">
-  <p:cSld>
-    <p:spTree>
-      <p:nvGrpSpPr>
-        <p:cNvPr id="1" name=""/>
-        <p:cNvGrpSpPr/>
-        <p:nvPr/>
-      </p:nvGrpSpPr>
-      <p:grpSpPr>
-        <a:xfrm>
-          <a:off x="0" y="0"/>
-          <a:ext cx="0" cy="0"/>
-          <a:chOff x="0" y="0"/>
-          <a:chExt cx="0" cy="0"/>
-        </a:xfrm>
-      </p:grpSpPr>
-      <p:sp>
-        <p:nvSpPr>
-          <p:cNvPr id="4" name="Flowchart: Magnetic Disk 3"/>
-          <p:cNvSpPr/>
-          <p:nvPr/>
-        </p:nvSpPr>
-        <p:spPr>
-          <a:xfrm>
-            <a:off x="719163" y="1057319"/>
-            <a:ext cx="1858296" cy="1022555"/>
-          </a:xfrm>
-          <a:prstGeom prst="flowChartMagneticDisk">
-            <a:avLst/>
-          </a:prstGeom>
-        </p:spPr>
-        <p:style>
-          <a:lnRef idx="2">
-            <a:schemeClr val="accent2">
-              <a:shade val="50000"/>
-            </a:schemeClr>
-          </a:lnRef>
-          <a:fillRef idx="1">
-            <a:schemeClr val="accent2"/>
-          </a:fillRef>
-          <a:effectRef idx="0">
-            <a:schemeClr val="accent2"/>
-          </a:effectRef>
-          <a:fontRef idx="minor">
-            <a:schemeClr val="lt1"/>
-          </a:fontRef>
-        </p:style>
-        <p:txBody>
-          <a:bodyPr rtlCol="0" anchor="ctr"/>
-          <a:lstStyle/>
-          <a:p>
-            <a:pPr algn="ctr"/>
-            <a:r>
-              <a:rPr lang="en-GB" sz="1400" dirty="0" smtClean="0"/>
-              <a:t>git-wip-us.apache.org/</a:t>
-            </a:r>
-            <a:br>
-              <a:rPr lang="en-GB" sz="1400" dirty="0" smtClean="0"/>
-            </a:br>
-            <a:r>
-              <a:rPr lang="en-GB" sz="1400" dirty="0" smtClean="0"/>
-              <a:t>repos/</a:t>
-            </a:r>
-            <a:r>
-              <a:rPr lang="en-GB" sz="1400" dirty="0" err="1" smtClean="0"/>
-              <a:t>asf</a:t>
-            </a:r>
-            <a:r>
-              <a:rPr lang="en-GB" sz="1400" dirty="0" smtClean="0"/>
-              <a:t>/</a:t>
-            </a:r>
-            <a:r>
-              <a:rPr lang="en-GB" sz="1400" dirty="0" err="1" smtClean="0"/>
-              <a:t>isis.git</a:t>
-            </a:r>
-            <a:endParaRPr lang="en-US" sz="1400" dirty="0"/>
-          </a:p>
-        </p:txBody>
-      </p:sp>
-      <p:sp>
-        <p:nvSpPr>
-          <p:cNvPr id="5" name="Flowchart: Magnetic Disk 4"/>
-          <p:cNvSpPr/>
-          <p:nvPr/>
-        </p:nvSpPr>
-        <p:spPr>
-          <a:xfrm>
-            <a:off x="3307858" y="382401"/>
-            <a:ext cx="1858296" cy="1022555"/>
-          </a:xfrm>
-          <a:prstGeom prst="flowChartMagneticDisk">
-            <a:avLst/>
-          </a:prstGeom>
-        </p:spPr>
-        <p:style>
-          <a:lnRef idx="2">
-            <a:schemeClr val="accent2">
-              <a:shade val="50000"/>
-            </a:schemeClr>
-          </a:lnRef>
-          <a:fillRef idx="1">
-            <a:schemeClr val="accent2"/>
-          </a:fillRef>
-          <a:effectRef idx="0">
-            <a:schemeClr val="accent2"/>
-          </a:effectRef>
-          <a:fontRef idx="minor">
-            <a:schemeClr val="lt1"/>
-          </a:fontRef>
-        </p:style>
-        <p:txBody>
-          <a:bodyPr rtlCol="0" anchor="ctr"/>
-          <a:lstStyle/>
-          <a:p>
-            <a:pPr algn="ctr"/>
-            <a:r>
-              <a:rPr lang="en-GB" sz="1400" dirty="0" smtClean="0"/>
-              <a:t>git.apache.org/</a:t>
-            </a:r>
-            <a:br>
-              <a:rPr lang="en-GB" sz="1400" dirty="0" smtClean="0"/>
-            </a:br>
-            <a:r>
-              <a:rPr lang="en-GB" sz="1400" dirty="0" err="1" smtClean="0"/>
-              <a:t>isis.git</a:t>
-            </a:r>
-            <a:endParaRPr lang="en-US" sz="1400" dirty="0"/>
-          </a:p>
-        </p:txBody>
-      </p:sp>
-      <p:sp>
-        <p:nvSpPr>
-          <p:cNvPr id="6" name="Flowchart: Magnetic Disk 5"/>
-          <p:cNvSpPr/>
-          <p:nvPr/>
-        </p:nvSpPr>
-        <p:spPr>
-          <a:xfrm>
-            <a:off x="3775945" y="1860404"/>
-            <a:ext cx="1858296" cy="1022555"/>
-          </a:xfrm>
-          <a:prstGeom prst="flowChartMagneticDisk">
-            <a:avLst/>
-          </a:prstGeom>
-        </p:spPr>
-        <p:style>
-          <a:lnRef idx="2">
-            <a:schemeClr val="accent1">
-              <a:shade val="50000"/>
-            </a:schemeClr>
-          </a:lnRef>
-          <a:fillRef idx="1">
-            <a:schemeClr val="accent1"/>
-          </a:fillRef>
-          <a:effectRef idx="0">
-            <a:schemeClr val="accent1"/>
-          </a:effectRef>
-          <a:fontRef idx="minor">
-            <a:schemeClr val="lt1"/>
-          </a:fontRef>
-        </p:style>
-        <p:txBody>
-          <a:bodyPr rtlCol="0" anchor="ctr"/>
-          <a:lstStyle/>
-          <a:p>
-            <a:pPr algn="ctr"/>
-            <a:r>
-              <a:rPr lang="en-GB" sz="1400" dirty="0" smtClean="0"/>
-              <a:t>github.com/</a:t>
-            </a:r>
-            <a:br>
-              <a:rPr lang="en-GB" sz="1400" dirty="0" smtClean="0"/>
-            </a:br>
-            <a:r>
-              <a:rPr lang="en-GB" sz="1400" dirty="0" smtClean="0"/>
-              <a:t>apache/</a:t>
-            </a:r>
-            <a:r>
-              <a:rPr lang="en-GB" sz="1400" dirty="0" err="1" smtClean="0"/>
-              <a:t>isis.git</a:t>
-            </a:r>
-            <a:endParaRPr lang="en-US" sz="1400" dirty="0"/>
-          </a:p>
-        </p:txBody>
-      </p:sp>
-      <p:sp>
-        <p:nvSpPr>
-          <p:cNvPr id="8" name="Rectangle 7"/>
-          <p:cNvSpPr/>
-          <p:nvPr/>
-        </p:nvSpPr>
-        <p:spPr>
-          <a:xfrm>
-            <a:off x="820998" y="4858188"/>
-            <a:ext cx="1681316" cy="1130710"/>
-          </a:xfrm>
-          <a:prstGeom prst="rect">
-            <a:avLst/>
-          </a:prstGeom>
-        </p:spPr>
-        <p:style>
-          <a:lnRef idx="2">
-            <a:schemeClr val="accent3">
-              <a:shade val="50000"/>
-            </a:schemeClr>
-          </a:lnRef>
-          <a:fillRef idx="1">
-            <a:schemeClr val="accent3"/>
-          </a:fillRef>
-          <a:effectRef idx="0">
-            <a:schemeClr val="accent3"/>
-          </a:effectRef>
-          <a:fontRef idx="minor">
-            <a:schemeClr val="lt1"/>
-          </a:fontRef>
-        </p:style>
-        <p:txBody>
-          <a:bodyPr rtlCol="0" anchor="ctr"/>
-          <a:lstStyle/>
-          <a:p>
-            <a:pPr algn="ctr"/>
-            <a:endParaRPr lang="en-US"/>
-          </a:p>
-        </p:txBody>
-      </p:sp>
-      <p:sp>
-        <p:nvSpPr>
-          <p:cNvPr id="9" name="Flowchart: Magnetic Disk 8"/>
-          <p:cNvSpPr/>
-          <p:nvPr/>
-        </p:nvSpPr>
-        <p:spPr>
-          <a:xfrm>
-            <a:off x="997979" y="4990921"/>
-            <a:ext cx="1297856" cy="870155"/>
-          </a:xfrm>
-          <a:prstGeom prst="flowChartMagneticDisk">
-            <a:avLst/>
-          </a:prstGeom>
-        </p:spPr>
-        <p:style>
-          <a:lnRef idx="2">
-            <a:schemeClr val="accent6">
-              <a:shade val="50000"/>
-            </a:schemeClr>
-          </a:lnRef>
-          <a:fillRef idx="1">
-            <a:schemeClr val="accent6"/>
-          </a:fillRef>
-          <a:effectRef idx="0">
-            <a:schemeClr val="accent6"/>
-          </a:effectRef>
-          <a:fontRef idx="minor">
-            <a:schemeClr val="lt1"/>
-          </a:fontRef>
-        </p:style>
-        <p:txBody>
-          <a:bodyPr rtlCol="0" anchor="ctr"/>
-          <a:lstStyle/>
-          <a:p>
-            <a:pPr algn="ctr"/>
-            <a:r>
-              <a:rPr lang="en-GB" sz="1400" dirty="0" smtClean="0"/>
-              <a:t>local git clone</a:t>
-            </a:r>
-            <a:endParaRPr lang="en-US" sz="1400" dirty="0"/>
-          </a:p>
-        </p:txBody>
-      </p:sp>
-      <p:sp>
-        <p:nvSpPr>
-          <p:cNvPr id="10" name="Trapezoid 9"/>
-          <p:cNvSpPr/>
-          <p:nvPr/>
-        </p:nvSpPr>
-        <p:spPr>
-          <a:xfrm>
-            <a:off x="634183" y="6077386"/>
-            <a:ext cx="2074607" cy="501446"/>
-          </a:xfrm>
-          <a:prstGeom prst="trapezoid">
-            <a:avLst>
-              <a:gd name="adj" fmla="val 40686"/>
-            </a:avLst>
-          </a:prstGeom>
-        </p:spPr>
-        <p:style>
-          <a:lnRef idx="2">
-            <a:schemeClr val="accent3">
-              <a:shade val="50000"/>
-            </a:schemeClr>
-          </a:lnRef>
-          <a:fillRef idx="1">
-            <a:schemeClr val="accent3"/>
-          </a:fillRef>
-          <a:effectRef idx="0">
-            <a:schemeClr val="accent3"/>
-          </a:effectRef>
-          <a:fontRef idx="minor">
-            <a:schemeClr val="lt1"/>
-          </a:fontRef>
-        </p:style>
-        <p:txBody>
-          <a:bodyPr rtlCol="0" anchor="ctr"/>
-          <a:lstStyle/>
-          <a:p>
-            <a:pPr algn="ctr"/>
-            <a:r>
-              <a:rPr lang="en-GB" dirty="0" smtClean="0"/>
-              <a:t>COMMITTER</a:t>
-            </a:r>
-            <a:endParaRPr lang="en-US" dirty="0"/>
-          </a:p>
-        </p:txBody>
-      </p:sp>
-      <p:sp>
-        <p:nvSpPr>
-          <p:cNvPr id="11" name="Rectangle 10"/>
-          <p:cNvSpPr/>
-          <p:nvPr/>
-        </p:nvSpPr>
-        <p:spPr>
-          <a:xfrm>
-            <a:off x="6386762" y="4858188"/>
-            <a:ext cx="1681316" cy="1130710"/>
-          </a:xfrm>
-          <a:prstGeom prst="rect">
-            <a:avLst/>
-          </a:prstGeom>
-        </p:spPr>
-        <p:style>
-          <a:lnRef idx="2">
-            <a:schemeClr val="accent3">
-              <a:shade val="50000"/>
-            </a:schemeClr>
-          </a:lnRef>
-          <a:fillRef idx="1">
-            <a:schemeClr val="accent3"/>
-          </a:fillRef>
-          <a:effectRef idx="0">
-            <a:schemeClr val="accent3"/>
-          </a:effectRef>
-          <a:fontRef idx="minor">
-            <a:schemeClr val="lt1"/>
-          </a:fontRef>
-        </p:style>
-        <p:txBody>
-          <a:bodyPr rtlCol="0" anchor="ctr"/>
-          <a:lstStyle/>
-          <a:p>
-            <a:pPr algn="ctr"/>
-            <a:endParaRPr lang="en-US"/>
-          </a:p>
-        </p:txBody>
-      </p:sp>
-      <p:sp>
-        <p:nvSpPr>
-          <p:cNvPr id="12" name="Flowchart: Magnetic Disk 11"/>
-          <p:cNvSpPr/>
-          <p:nvPr/>
-        </p:nvSpPr>
-        <p:spPr>
-          <a:xfrm>
-            <a:off x="6563743" y="4990921"/>
-            <a:ext cx="1297856" cy="870155"/>
-          </a:xfrm>
-          <a:prstGeom prst="flowChartMagneticDisk">
-            <a:avLst/>
-          </a:prstGeom>
-        </p:spPr>
-        <p:style>
-          <a:lnRef idx="2">
-            <a:schemeClr val="accent6">
-              <a:shade val="50000"/>
-            </a:schemeClr>
-          </a:lnRef>
-          <a:fillRef idx="1">
-            <a:schemeClr val="accent6"/>
-          </a:fillRef>
-          <a:effectRef idx="0">
-            <a:schemeClr val="accent6"/>
-          </a:effectRef>
-          <a:fontRef idx="minor">
-            <a:schemeClr val="lt1"/>
-          </a:fontRef>
-        </p:style>
-        <p:txBody>
-          <a:bodyPr rtlCol="0" anchor="ctr"/>
-          <a:lstStyle/>
-          <a:p>
-            <a:pPr algn="ctr"/>
-            <a:r>
-              <a:rPr lang="en-GB" sz="1400" dirty="0" smtClean="0"/>
-              <a:t>local git clone</a:t>
-            </a:r>
-            <a:endParaRPr lang="en-US" sz="1400" dirty="0"/>
-          </a:p>
-        </p:txBody>
-      </p:sp>
-      <p:sp>
-        <p:nvSpPr>
-          <p:cNvPr id="13" name="Trapezoid 12"/>
-          <p:cNvSpPr/>
-          <p:nvPr/>
-        </p:nvSpPr>
-        <p:spPr>
-          <a:xfrm>
-            <a:off x="6199947" y="6077386"/>
-            <a:ext cx="2074607" cy="501446"/>
-          </a:xfrm>
-          <a:prstGeom prst="trapezoid">
-            <a:avLst>
-              <a:gd name="adj" fmla="val 40686"/>
-            </a:avLst>
-          </a:prstGeom>
-        </p:spPr>
-        <p:style>
-          <a:lnRef idx="2">
-            <a:schemeClr val="accent3">
-              <a:shade val="50000"/>
-            </a:schemeClr>
-          </a:lnRef>
-          <a:fillRef idx="1">
-            <a:schemeClr val="accent3"/>
-          </a:fillRef>
-          <a:effectRef idx="0">
-            <a:schemeClr val="accent3"/>
-          </a:effectRef>
-          <a:fontRef idx="minor">
-            <a:schemeClr val="lt1"/>
-          </a:fontRef>
-        </p:style>
-        <p:txBody>
-          <a:bodyPr rtlCol="0" anchor="ctr"/>
-          <a:lstStyle/>
-          <a:p>
-            <a:pPr algn="ctr"/>
-            <a:r>
-              <a:rPr lang="en-GB" dirty="0" smtClean="0"/>
-              <a:t>CONTRIBUTOR</a:t>
-            </a:r>
-            <a:endParaRPr lang="en-US" dirty="0"/>
-          </a:p>
-        </p:txBody>
-      </p:sp>
-      <p:cxnSp>
-        <p:nvCxnSpPr>
-          <p:cNvPr id="15" name="Curved Connector 14"/>
-          <p:cNvCxnSpPr>
-            <a:stCxn id="4" idx="4"/>
-            <a:endCxn id="5" idx="2"/>
-          </p:cNvCxnSpPr>
-          <p:nvPr/>
-        </p:nvCxnSpPr>
-        <p:spPr>
-          <a:xfrm flipV="1">
-            <a:off x="2577459" y="893679"/>
-            <a:ext cx="730399" cy="674918"/>
-          </a:xfrm>
-          <a:prstGeom prst="curvedConnector3">
-            <a:avLst>
-              <a:gd name="adj1" fmla="val 50000"/>
-            </a:avLst>
-          </a:prstGeom>
-          <a:ln w="28575">
-            <a:solidFill>
-              <a:schemeClr val="bg2">
-                <a:lumMod val="75000"/>
-              </a:schemeClr>
-            </a:solidFill>
-            <a:prstDash val="sysDash"/>
-            <a:tailEnd type="triangle" w="lg" len="lg"/>
-          </a:ln>
-        </p:spPr>
-        <p:style>
-          <a:lnRef idx="1">
-            <a:schemeClr val="accent1"/>
-          </a:lnRef>
-          <a:fillRef idx="0">
-            <a:schemeClr val="accent1"/>
-          </a:fillRef>
-          <a:effectRef idx="0">
-            <a:schemeClr val="accent1"/>
-          </a:effectRef>
-          <a:fontRef idx="minor">
-            <a:schemeClr val="tx1"/>
-          </a:fontRef>
-        </p:style>
-      </p:cxnSp>
-      <p:cxnSp>
-        <p:nvCxnSpPr>
-          <p:cNvPr id="16" name="Curved Connector 15"/>
-          <p:cNvCxnSpPr>
-            <a:stCxn id="4" idx="4"/>
-            <a:endCxn id="6" idx="2"/>
-          </p:cNvCxnSpPr>
-          <p:nvPr/>
-        </p:nvCxnSpPr>
-        <p:spPr>
-          <a:xfrm>
-            <a:off x="2577459" y="1568597"/>
-            <a:ext cx="1198486" cy="803085"/>
-          </a:xfrm>
-          <a:prstGeom prst="curvedConnector3">
-            <a:avLst>
-              <a:gd name="adj1" fmla="val 50000"/>
-            </a:avLst>
-          </a:prstGeom>
-          <a:ln w="28575">
-            <a:solidFill>
-              <a:schemeClr val="accent1"/>
-            </a:solidFill>
-            <a:prstDash val="sysDash"/>
-            <a:tailEnd type="triangle" w="lg" len="lg"/>
-          </a:ln>
-        </p:spPr>
-        <p:style>
-          <a:lnRef idx="1">
-            <a:schemeClr val="accent1"/>
-          </a:lnRef>
-          <a:fillRef idx="0">
-            <a:schemeClr val="accent1"/>
-          </a:fillRef>
-          <a:effectRef idx="0">
-            <a:schemeClr val="accent1"/>
-          </a:effectRef>
-          <a:fontRef idx="minor">
-            <a:schemeClr val="tx1"/>
-          </a:fontRef>
-        </p:style>
-      </p:cxnSp>
-      <p:cxnSp>
-        <p:nvCxnSpPr>
-          <p:cNvPr id="23" name="Curved Connector 22"/>
-          <p:cNvCxnSpPr>
-            <a:stCxn id="6" idx="4"/>
-            <a:endCxn id="12" idx="4"/>
-          </p:cNvCxnSpPr>
-          <p:nvPr/>
-        </p:nvCxnSpPr>
-        <p:spPr>
-          <a:xfrm>
-            <a:off x="5634241" y="2371682"/>
-            <a:ext cx="2227358" cy="3054317"/>
-          </a:xfrm>
-          <a:prstGeom prst="curvedConnector3">
-            <a:avLst>
-              <a:gd name="adj1" fmla="val 110263"/>
-            </a:avLst>
-          </a:prstGeom>
-          <a:ln w="28575">
-            <a:solidFill>
-              <a:schemeClr val="bg2">
-                <a:lumMod val="75000"/>
-              </a:schemeClr>
-            </a:solidFill>
-            <a:prstDash val="sysDot"/>
-            <a:tailEnd type="triangle" w="lg" len="lg"/>
-          </a:ln>
-        </p:spPr>
-        <p:style>
-          <a:lnRef idx="1">
-            <a:schemeClr val="accent1"/>
-          </a:lnRef>
-          <a:fillRef idx="0">
-            <a:schemeClr val="accent1"/>
-          </a:fillRef>
-          <a:effectRef idx="0">
-            <a:schemeClr val="accent1"/>
-          </a:effectRef>
-          <a:fontRef idx="minor">
-            <a:schemeClr val="tx1"/>
-          </a:fontRef>
-        </p:style>
-      </p:cxnSp>
-      <p:cxnSp>
-        <p:nvCxnSpPr>
-          <p:cNvPr id="27" name="Curved Connector 26"/>
-          <p:cNvCxnSpPr>
-            <a:stCxn id="12" idx="2"/>
-            <a:endCxn id="62" idx="3"/>
-          </p:cNvCxnSpPr>
-          <p:nvPr/>
-        </p:nvCxnSpPr>
-        <p:spPr>
-          <a:xfrm rot="10800000" flipV="1">
-            <a:off x="4890417" y="5425998"/>
-            <a:ext cx="1673326" cy="244587"/>
-          </a:xfrm>
-          <a:prstGeom prst="curvedConnector3">
-            <a:avLst>
-              <a:gd name="adj1" fmla="val 50000"/>
-            </a:avLst>
-          </a:prstGeom>
-          <a:ln w="28575">
-            <a:prstDash val="solid"/>
-            <a:tailEnd type="triangle" w="lg" len="lg"/>
-          </a:ln>
-        </p:spPr>
-        <p:style>
-          <a:lnRef idx="1">
-            <a:schemeClr val="accent1"/>
-          </a:lnRef>
-          <a:fillRef idx="0">
-            <a:schemeClr val="accent1"/>
-          </a:fillRef>
-          <a:effectRef idx="0">
-            <a:schemeClr val="accent1"/>
-          </a:effectRef>
-          <a:fontRef idx="minor">
-            <a:schemeClr val="tx1"/>
-          </a:fontRef>
-        </p:style>
-      </p:cxnSp>
-      <p:cxnSp>
-        <p:nvCxnSpPr>
-          <p:cNvPr id="34" name="Curved Connector 33"/>
-          <p:cNvCxnSpPr>
-            <a:stCxn id="4" idx="2"/>
-            <a:endCxn id="9" idx="2"/>
-          </p:cNvCxnSpPr>
-          <p:nvPr/>
-        </p:nvCxnSpPr>
-        <p:spPr>
-          <a:xfrm rot="10800000" flipH="1" flipV="1">
-            <a:off x="719163" y="1568597"/>
-            <a:ext cx="278816" cy="3857402"/>
-          </a:xfrm>
-          <a:prstGeom prst="curvedConnector3">
-            <a:avLst>
-              <a:gd name="adj1" fmla="val -81990"/>
-            </a:avLst>
-          </a:prstGeom>
-          <a:ln w="28575">
-            <a:solidFill>
-              <a:schemeClr val="bg2">
-                <a:lumMod val="75000"/>
-              </a:schemeClr>
-            </a:solidFill>
-            <a:prstDash val="sysDot"/>
-            <a:tailEnd type="triangle" w="lg" len="lg"/>
-          </a:ln>
-        </p:spPr>
-        <p:style>
-          <a:lnRef idx="1">
-            <a:schemeClr val="accent1"/>
-          </a:lnRef>
-          <a:fillRef idx="0">
-            <a:schemeClr val="accent1"/>
-          </a:fillRef>
-          <a:effectRef idx="0">
-            <a:schemeClr val="accent1"/>
-          </a:effectRef>
-          <a:fontRef idx="minor">
-            <a:schemeClr val="tx1"/>
-          </a:fontRef>
-        </p:style>
-      </p:cxnSp>
-      <p:cxnSp>
-        <p:nvCxnSpPr>
-          <p:cNvPr id="39" name="Curved Connector 38"/>
-          <p:cNvCxnSpPr>
-            <a:stCxn id="9" idx="1"/>
-            <a:endCxn id="4" idx="3"/>
-          </p:cNvCxnSpPr>
-          <p:nvPr/>
-        </p:nvCxnSpPr>
-        <p:spPr>
-          <a:xfrm rot="5400000" flipH="1" flipV="1">
-            <a:off x="192086" y="3534696"/>
-            <a:ext cx="2911047" cy="1404"/>
-          </a:xfrm>
-          <a:prstGeom prst="curvedConnector3">
-            <a:avLst>
-              <a:gd name="adj1" fmla="val 50000"/>
-            </a:avLst>
-          </a:prstGeom>
-          <a:ln w="28575">
-            <a:prstDash val="solid"/>
-            <a:headEnd type="triangle" w="lg" len="lg"/>
-            <a:tailEnd type="triangle" w="lg" len="lg"/>
-          </a:ln>
-        </p:spPr>
-        <p:style>
-          <a:lnRef idx="1">
-            <a:schemeClr val="accent1"/>
-          </a:lnRef>
-          <a:fillRef idx="0">
-            <a:schemeClr val="accent1"/>
-          </a:fillRef>
-          <a:effectRef idx="0">
-            <a:schemeClr val="accent1"/>
-          </a:effectRef>
-          <a:fontRef idx="minor">
-            <a:schemeClr val="tx1"/>
-          </a:fontRef>
-        </p:style>
-      </p:cxnSp>
-      <p:cxnSp>
-        <p:nvCxnSpPr>
-          <p:cNvPr id="42" name="Curved Connector 41"/>
-          <p:cNvCxnSpPr>
-            <a:stCxn id="33" idx="1"/>
-            <a:endCxn id="9" idx="4"/>
-          </p:cNvCxnSpPr>
-          <p:nvPr/>
-        </p:nvCxnSpPr>
-        <p:spPr>
-          <a:xfrm rot="10800000" flipV="1">
-            <a:off x="2295836" y="5305737"/>
-            <a:ext cx="1685905" cy="120261"/>
-          </a:xfrm>
-          <a:prstGeom prst="curvedConnector3">
-            <a:avLst>
-              <a:gd name="adj1" fmla="val 50000"/>
-            </a:avLst>
-          </a:prstGeom>
-          <a:ln w="28575">
-            <a:prstDash val="dashDot"/>
-            <a:tailEnd type="triangle" w="lg" len="lg"/>
-          </a:ln>
-        </p:spPr>
-        <p:style>
-          <a:lnRef idx="1">
-            <a:schemeClr val="accent1"/>
-          </a:lnRef>
-          <a:fillRef idx="0">
-            <a:schemeClr val="accent1"/>
-          </a:fillRef>
-          <a:effectRef idx="0">
-            <a:schemeClr val="accent1"/>
-          </a:effectRef>
-          <a:fontRef idx="minor">
-            <a:schemeClr val="tx1"/>
-          </a:fontRef>
-        </p:style>
-      </p:cxnSp>
-      <p:sp>
-        <p:nvSpPr>
-          <p:cNvPr id="50" name="TextBox 49"/>
-          <p:cNvSpPr txBox="1"/>
-          <p:nvPr/>
-        </p:nvSpPr>
-        <p:spPr>
-          <a:xfrm>
-            <a:off x="3132763" y="1437164"/>
-            <a:ext cx="1211358" cy="307777"/>
-          </a:xfrm>
-          <a:prstGeom prst="rect">
-            <a:avLst/>
-          </a:prstGeom>
-          <a:noFill/>
-        </p:spPr>
-        <p:txBody>
-          <a:bodyPr wrap="none" rtlCol="0">
-            <a:spAutoFit/>
-          </a:bodyPr>
-          <a:lstStyle/>
-          <a:p>
-            <a:pPr algn="ctr"/>
-            <a:r>
-              <a:rPr lang="en-GB" sz="1400" dirty="0" smtClean="0"/>
-              <a:t>real-time sync</a:t>
-            </a:r>
-            <a:endParaRPr lang="en-US" sz="1400" dirty="0"/>
-          </a:p>
-        </p:txBody>
-      </p:sp>
-      <p:sp>
-        <p:nvSpPr>
-          <p:cNvPr id="51" name="TextBox 50"/>
-          <p:cNvSpPr txBox="1"/>
-          <p:nvPr/>
-        </p:nvSpPr>
-        <p:spPr>
-          <a:xfrm>
-            <a:off x="1725678" y="3317414"/>
-            <a:ext cx="766555" cy="523220"/>
-          </a:xfrm>
-          <a:prstGeom prst="rect">
-            <a:avLst/>
-          </a:prstGeom>
-          <a:noFill/>
-        </p:spPr>
-        <p:txBody>
-          <a:bodyPr wrap="none" rtlCol="0">
-            <a:spAutoFit/>
-          </a:bodyPr>
-          <a:lstStyle/>
-          <a:p>
-            <a:pPr algn="ctr"/>
-            <a:r>
-              <a:rPr lang="en-GB" sz="1400" dirty="0" smtClean="0"/>
-              <a:t>git pull</a:t>
-            </a:r>
-            <a:br>
-              <a:rPr lang="en-GB" sz="1400" dirty="0" smtClean="0"/>
-            </a:br>
-            <a:r>
-              <a:rPr lang="en-GB" sz="1400" dirty="0" smtClean="0"/>
-              <a:t>git push</a:t>
-            </a:r>
-            <a:endParaRPr lang="en-US" sz="1400" dirty="0"/>
-          </a:p>
-        </p:txBody>
-      </p:sp>
-      <p:cxnSp>
-        <p:nvCxnSpPr>
-          <p:cNvPr id="53" name="Curved Connector 52"/>
-          <p:cNvCxnSpPr>
-            <a:stCxn id="6" idx="3"/>
-            <a:endCxn id="12" idx="1"/>
-          </p:cNvCxnSpPr>
-          <p:nvPr/>
-        </p:nvCxnSpPr>
-        <p:spPr>
-          <a:xfrm rot="16200000" flipH="1">
-            <a:off x="4904901" y="2683151"/>
-            <a:ext cx="2107962" cy="2507578"/>
-          </a:xfrm>
-          <a:prstGeom prst="curvedConnector3">
-            <a:avLst>
-              <a:gd name="adj1" fmla="val 50000"/>
-            </a:avLst>
-          </a:prstGeom>
-          <a:ln w="28575">
-            <a:prstDash val="solid"/>
-            <a:tailEnd type="triangle" w="lg" len="lg"/>
-          </a:ln>
-        </p:spPr>
-        <p:style>
-          <a:lnRef idx="1">
-            <a:schemeClr val="accent1"/>
-          </a:lnRef>
-          <a:fillRef idx="0">
-            <a:schemeClr val="accent1"/>
-          </a:fillRef>
-          <a:effectRef idx="0">
-            <a:schemeClr val="accent1"/>
-          </a:effectRef>
-          <a:fontRef idx="minor">
-            <a:schemeClr val="tx1"/>
-          </a:fontRef>
-        </p:style>
-      </p:cxnSp>
-      <p:sp>
-        <p:nvSpPr>
-          <p:cNvPr id="56" name="TextBox 55"/>
-          <p:cNvSpPr txBox="1"/>
-          <p:nvPr/>
-        </p:nvSpPr>
-        <p:spPr>
-          <a:xfrm>
-            <a:off x="4942474" y="5171398"/>
-            <a:ext cx="1371209" cy="307777"/>
-          </a:xfrm>
-          <a:prstGeom prst="rect">
-            <a:avLst/>
-          </a:prstGeom>
-          <a:noFill/>
-        </p:spPr>
-        <p:txBody>
-          <a:bodyPr wrap="none" rtlCol="0">
-            <a:spAutoFit/>
-          </a:bodyPr>
-          <a:lstStyle/>
-          <a:p>
-            <a:pPr algn="ctr"/>
-            <a:r>
-              <a:rPr lang="en-GB" sz="1400" dirty="0" smtClean="0"/>
-              <a:t>git format-patch</a:t>
-            </a:r>
-            <a:endParaRPr lang="en-US" sz="1400" dirty="0"/>
-          </a:p>
-        </p:txBody>
-      </p:sp>
-      <p:sp>
-        <p:nvSpPr>
-          <p:cNvPr id="57" name="TextBox 56"/>
-          <p:cNvSpPr txBox="1"/>
-          <p:nvPr/>
-        </p:nvSpPr>
-        <p:spPr>
-          <a:xfrm>
-            <a:off x="8246839" y="5053961"/>
-            <a:ext cx="853118" cy="523220"/>
-          </a:xfrm>
-          <a:prstGeom prst="rect">
-            <a:avLst/>
-          </a:prstGeom>
-          <a:noFill/>
-        </p:spPr>
-        <p:txBody>
-          <a:bodyPr wrap="none" rtlCol="0">
-            <a:spAutoFit/>
-          </a:bodyPr>
-          <a:lstStyle/>
-          <a:p>
-            <a:pPr algn="ctr"/>
-            <a:r>
-              <a:rPr lang="en-GB" sz="1400" dirty="0" smtClean="0"/>
-              <a:t>one-time</a:t>
-            </a:r>
-            <a:br>
-              <a:rPr lang="en-GB" sz="1400" dirty="0" smtClean="0"/>
-            </a:br>
-            <a:r>
-              <a:rPr lang="en-GB" sz="1400" dirty="0" smtClean="0"/>
-              <a:t>clone</a:t>
-            </a:r>
-            <a:endParaRPr lang="en-US" sz="1400" dirty="0"/>
-          </a:p>
-        </p:txBody>
-      </p:sp>
-      <p:sp>
-        <p:nvSpPr>
-          <p:cNvPr id="58" name="TextBox 57"/>
-          <p:cNvSpPr txBox="1"/>
-          <p:nvPr/>
-        </p:nvSpPr>
-        <p:spPr>
-          <a:xfrm>
-            <a:off x="486442" y="3521037"/>
-            <a:ext cx="853118" cy="523220"/>
-          </a:xfrm>
-          <a:prstGeom prst="rect">
-            <a:avLst/>
-          </a:prstGeom>
-          <a:noFill/>
-        </p:spPr>
-        <p:txBody>
-          <a:bodyPr wrap="none" rtlCol="0">
-            <a:spAutoFit/>
-          </a:bodyPr>
-          <a:lstStyle/>
-          <a:p>
-            <a:pPr algn="ctr"/>
-            <a:r>
-              <a:rPr lang="en-GB" sz="1400" dirty="0" smtClean="0"/>
-              <a:t>one-time</a:t>
-            </a:r>
-            <a:br>
-              <a:rPr lang="en-GB" sz="1400" dirty="0" smtClean="0"/>
-            </a:br>
-            <a:r>
-              <a:rPr lang="en-GB" sz="1400" dirty="0" smtClean="0"/>
-              <a:t>clone</a:t>
-            </a:r>
-            <a:endParaRPr lang="en-US" sz="1400" dirty="0"/>
-          </a:p>
-        </p:txBody>
-      </p:sp>
-      <p:sp>
-        <p:nvSpPr>
-          <p:cNvPr id="59" name="TextBox 58"/>
-          <p:cNvSpPr txBox="1"/>
-          <p:nvPr/>
-        </p:nvSpPr>
-        <p:spPr>
-          <a:xfrm>
-            <a:off x="2957017" y="4911803"/>
-            <a:ext cx="811441" cy="307777"/>
-          </a:xfrm>
-          <a:prstGeom prst="rect">
-            <a:avLst/>
-          </a:prstGeom>
-          <a:noFill/>
-        </p:spPr>
-        <p:txBody>
-          <a:bodyPr wrap="none" rtlCol="0">
-            <a:spAutoFit/>
-          </a:bodyPr>
-          <a:lstStyle/>
-          <a:p>
-            <a:pPr algn="ctr"/>
-            <a:r>
-              <a:rPr lang="en-GB" sz="1400" dirty="0" smtClean="0"/>
-              <a:t>git apply</a:t>
-            </a:r>
-            <a:endParaRPr lang="en-US" sz="1400" dirty="0"/>
-          </a:p>
-        </p:txBody>
-      </p:sp>
-      <p:sp>
-        <p:nvSpPr>
-          <p:cNvPr id="33" name="Flowchart: Document 32"/>
-          <p:cNvSpPr/>
-          <p:nvPr/>
-        </p:nvSpPr>
-        <p:spPr>
-          <a:xfrm>
-            <a:off x="3981740" y="4944972"/>
-            <a:ext cx="706244" cy="721531"/>
-          </a:xfrm>
-          <a:prstGeom prst="flowChartDocument">
-            <a:avLst/>
-          </a:prstGeom>
-        </p:spPr>
-        <p:style>
-          <a:lnRef idx="2">
-            <a:schemeClr val="accent4">
-              <a:shade val="50000"/>
-            </a:schemeClr>
-          </a:lnRef>
-          <a:fillRef idx="1">
-            <a:schemeClr val="accent4"/>
-          </a:fillRef>
-          <a:effectRef idx="0">
-            <a:schemeClr val="accent4"/>
-          </a:effectRef>
-          <a:fontRef idx="minor">
-            <a:schemeClr val="lt1"/>
-          </a:fontRef>
-        </p:style>
-        <p:txBody>
-          <a:bodyPr rtlCol="0" anchor="ctr"/>
-          <a:lstStyle/>
-          <a:p>
-            <a:pPr algn="ctr"/>
-            <a:r>
-              <a:rPr lang="en-GB" dirty="0" smtClean="0"/>
-              <a:t>JIRA</a:t>
-            </a:r>
-            <a:endParaRPr lang="en-US" dirty="0"/>
-          </a:p>
-        </p:txBody>
-      </p:sp>
-      <p:sp>
-        <p:nvSpPr>
-          <p:cNvPr id="62" name="Flowchart: Document 61"/>
-          <p:cNvSpPr/>
-          <p:nvPr/>
-        </p:nvSpPr>
-        <p:spPr>
-          <a:xfrm>
-            <a:off x="4322796" y="5413893"/>
-            <a:ext cx="567621" cy="513386"/>
-          </a:xfrm>
-          <a:prstGeom prst="flowChartDocument">
-            <a:avLst/>
-          </a:prstGeom>
-        </p:spPr>
-        <p:style>
-          <a:lnRef idx="2">
-            <a:schemeClr val="accent5">
-              <a:shade val="50000"/>
-            </a:schemeClr>
-          </a:lnRef>
-          <a:fillRef idx="1">
-            <a:schemeClr val="accent5"/>
-          </a:fillRef>
-          <a:effectRef idx="0">
-            <a:schemeClr val="accent5"/>
-          </a:effectRef>
-          <a:fontRef idx="minor">
-            <a:schemeClr val="lt1"/>
-          </a:fontRef>
-        </p:style>
-        <p:txBody>
-          <a:bodyPr rtlCol="0" anchor="ctr"/>
-          <a:lstStyle/>
-          <a:p>
-            <a:pPr algn="ctr"/>
-            <a:r>
-              <a:rPr lang="en-GB" sz="1100" dirty="0" smtClean="0"/>
-              <a:t>patch</a:t>
-            </a:r>
-            <a:endParaRPr lang="en-US" sz="1100" dirty="0"/>
-          </a:p>
-        </p:txBody>
-      </p:sp>
-    </p:spTree>
-    <p:extLst>
-      <p:ext uri="{BB962C8B-B14F-4D97-AF65-F5344CB8AC3E}">
-        <p14:creationId xmlns:p14="http://schemas.microsoft.com/office/powerpoint/2010/main" val="3920264958"/>
       </p:ext>
     </p:extLst>
   </p:cSld>
@@ -5610,7 +4169,7 @@
   <a:extraClrSchemeLst/>
   <a:extLst>
     <a:ext uri="{05A4C25C-085E-4340-85A3-A5531E510DB2}">
-      <thm15:themeFamily xmlns="" xmlns:thm15="http://schemas.microsoft.com/office/thememl/2012/main" name="Office Theme" id="{62F939B6-93AF-4DB8-9C6B-D6C7DFDC589F}" vid="{4A3C46E8-61CC-4603-A589-7422A47A8E4A}"/>
+      <thm15:themeFamily xmlns:thm15="http://schemas.microsoft.com/office/thememl/2012/main" name="Office Theme" id="{62F939B6-93AF-4DB8-9C6B-D6C7DFDC589F}" vid="{4A3C46E8-61CC-4603-A589-7422A47A8E4A}"/>
     </a:ext>
   </a:extLst>
 </a:theme>

</xml_diff>